<commit_message>
bug fix slide 37
</commit_message>
<xml_diff>
--- a/classes/stats2022/Lecture03.pptx
+++ b/classes/stats2022/Lecture03.pptx
@@ -257,7 +257,7 @@
             <a:fld id="{70778D97-C3FD-45B9-9D4E-C62E122BCE58}" type="datetimeFigureOut">
               <a:rPr lang="en-US" smtClean="0"/>
               <a:pPr/>
-              <a:t>1/24/2018</a:t>
+              <a:t>2/1/2022</a:t>
             </a:fld>
             <a:endParaRPr lang="en-US"/>
           </a:p>
@@ -2914,7 +2914,7 @@
             <a:fld id="{1D8BD707-D9CF-40AE-B4C6-C98DA3205C09}" type="datetimeFigureOut">
               <a:rPr lang="en-US" smtClean="0"/>
               <a:pPr/>
-              <a:t>1/24/2018</a:t>
+              <a:t>2/1/2022</a:t>
             </a:fld>
             <a:endParaRPr lang="en-US"/>
           </a:p>
@@ -3079,7 +3079,7 @@
             <a:fld id="{1D8BD707-D9CF-40AE-B4C6-C98DA3205C09}" type="datetimeFigureOut">
               <a:rPr lang="en-US" smtClean="0"/>
               <a:pPr/>
-              <a:t>1/24/2018</a:t>
+              <a:t>2/1/2022</a:t>
             </a:fld>
             <a:endParaRPr lang="en-US"/>
           </a:p>
@@ -3254,7 +3254,7 @@
             <a:fld id="{1D8BD707-D9CF-40AE-B4C6-C98DA3205C09}" type="datetimeFigureOut">
               <a:rPr lang="en-US" smtClean="0"/>
               <a:pPr/>
-              <a:t>1/24/2018</a:t>
+              <a:t>2/1/2022</a:t>
             </a:fld>
             <a:endParaRPr lang="en-US"/>
           </a:p>
@@ -3419,7 +3419,7 @@
             <a:fld id="{1D8BD707-D9CF-40AE-B4C6-C98DA3205C09}" type="datetimeFigureOut">
               <a:rPr lang="en-US" smtClean="0"/>
               <a:pPr/>
-              <a:t>1/24/2018</a:t>
+              <a:t>2/1/2022</a:t>
             </a:fld>
             <a:endParaRPr lang="en-US"/>
           </a:p>
@@ -3661,7 +3661,7 @@
             <a:fld id="{1D8BD707-D9CF-40AE-B4C6-C98DA3205C09}" type="datetimeFigureOut">
               <a:rPr lang="en-US" smtClean="0"/>
               <a:pPr/>
-              <a:t>1/24/2018</a:t>
+              <a:t>2/1/2022</a:t>
             </a:fld>
             <a:endParaRPr lang="en-US"/>
           </a:p>
@@ -3943,7 +3943,7 @@
             <a:fld id="{1D8BD707-D9CF-40AE-B4C6-C98DA3205C09}" type="datetimeFigureOut">
               <a:rPr lang="en-US" smtClean="0"/>
               <a:pPr/>
-              <a:t>1/24/2018</a:t>
+              <a:t>2/1/2022</a:t>
             </a:fld>
             <a:endParaRPr lang="en-US"/>
           </a:p>
@@ -4359,7 +4359,7 @@
             <a:fld id="{1D8BD707-D9CF-40AE-B4C6-C98DA3205C09}" type="datetimeFigureOut">
               <a:rPr lang="en-US" smtClean="0"/>
               <a:pPr/>
-              <a:t>1/24/2018</a:t>
+              <a:t>2/1/2022</a:t>
             </a:fld>
             <a:endParaRPr lang="en-US"/>
           </a:p>
@@ -4473,7 +4473,7 @@
             <a:fld id="{1D8BD707-D9CF-40AE-B4C6-C98DA3205C09}" type="datetimeFigureOut">
               <a:rPr lang="en-US" smtClean="0"/>
               <a:pPr/>
-              <a:t>1/24/2018</a:t>
+              <a:t>2/1/2022</a:t>
             </a:fld>
             <a:endParaRPr lang="en-US"/>
           </a:p>
@@ -4565,7 +4565,7 @@
             <a:fld id="{1D8BD707-D9CF-40AE-B4C6-C98DA3205C09}" type="datetimeFigureOut">
               <a:rPr lang="en-US" smtClean="0"/>
               <a:pPr/>
-              <a:t>1/24/2018</a:t>
+              <a:t>2/1/2022</a:t>
             </a:fld>
             <a:endParaRPr lang="en-US"/>
           </a:p>
@@ -4837,7 +4837,7 @@
             <a:fld id="{1D8BD707-D9CF-40AE-B4C6-C98DA3205C09}" type="datetimeFigureOut">
               <a:rPr lang="en-US" smtClean="0"/>
               <a:pPr/>
-              <a:t>1/24/2018</a:t>
+              <a:t>2/1/2022</a:t>
             </a:fld>
             <a:endParaRPr lang="en-US"/>
           </a:p>
@@ -5086,7 +5086,7 @@
             <a:fld id="{1D8BD707-D9CF-40AE-B4C6-C98DA3205C09}" type="datetimeFigureOut">
               <a:rPr lang="en-US" smtClean="0"/>
               <a:pPr/>
-              <a:t>1/24/2018</a:t>
+              <a:t>2/1/2022</a:t>
             </a:fld>
             <a:endParaRPr lang="en-US"/>
           </a:p>
@@ -5294,7 +5294,7 @@
             <a:fld id="{1D8BD707-D9CF-40AE-B4C6-C98DA3205C09}" type="datetimeFigureOut">
               <a:rPr lang="en-US" smtClean="0"/>
               <a:pPr/>
-              <a:t>1/24/2018</a:t>
+              <a:t>2/1/2022</a:t>
             </a:fld>
             <a:endParaRPr lang="en-US"/>
           </a:p>
@@ -11827,7 +11827,7 @@
           <a:graphicData uri="http://schemas.openxmlformats.org/presentationml/2006/ole">
             <mc:AlternateContent xmlns:mc="http://schemas.openxmlformats.org/markup-compatibility/2006">
               <mc:Choice xmlns:v="urn:schemas-microsoft-com:vml" Requires="v">
-                <p:oleObj spid="_x0000_s133154" name="Bitmap Image" r:id="rId4" imgW="9771429" imgH="6973273" progId="PBrush">
+                <p:oleObj spid="_x0000_s133155" name="Bitmap Image" r:id="rId4" imgW="9771429" imgH="6973273" progId="PBrush">
                   <p:embed/>
                 </p:oleObj>
               </mc:Choice>
@@ -11992,7 +11992,7 @@
           <a:graphicData uri="http://schemas.openxmlformats.org/presentationml/2006/ole">
             <mc:AlternateContent xmlns:mc="http://schemas.openxmlformats.org/markup-compatibility/2006">
               <mc:Choice xmlns:v="urn:schemas-microsoft-com:vml" Requires="v">
-                <p:oleObj spid="_x0000_s134178" name="Bitmap Image" r:id="rId4" imgW="7857143" imgH="4667902" progId="PBrush">
+                <p:oleObj spid="_x0000_s134179" name="Bitmap Image" r:id="rId4" imgW="7857143" imgH="4667902" progId="PBrush">
                   <p:embed/>
                 </p:oleObj>
               </mc:Choice>
@@ -12162,7 +12162,7 @@
           <a:graphicData uri="http://schemas.openxmlformats.org/presentationml/2006/ole">
             <mc:AlternateContent xmlns:mc="http://schemas.openxmlformats.org/markup-compatibility/2006">
               <mc:Choice xmlns:v="urn:schemas-microsoft-com:vml" Requires="v">
-                <p:oleObj spid="_x0000_s135202" name="Bitmap Image" r:id="rId4" imgW="8411749" imgH="1752381" progId="PBrush">
+                <p:oleObj spid="_x0000_s135203" name="Bitmap Image" r:id="rId4" imgW="8411749" imgH="1752381" progId="PBrush">
                   <p:embed/>
                 </p:oleObj>
               </mc:Choice>
@@ -14126,7 +14126,7 @@
           <a:graphicData uri="http://schemas.openxmlformats.org/presentationml/2006/ole">
             <mc:AlternateContent xmlns:mc="http://schemas.openxmlformats.org/markup-compatibility/2006">
               <mc:Choice xmlns:v="urn:schemas-microsoft-com:vml" Requires="v">
-                <p:oleObj spid="_x0000_s136226" name="Bitmap Image" r:id="rId4" imgW="7516274" imgH="2933333" progId="PBrush">
+                <p:oleObj spid="_x0000_s136227" name="Bitmap Image" r:id="rId4" imgW="7516274" imgH="2933333" progId="PBrush">
                   <p:embed/>
                 </p:oleObj>
               </mc:Choice>
@@ -14847,7 +14847,7 @@
           <a:graphicData uri="http://schemas.openxmlformats.org/presentationml/2006/ole">
             <mc:AlternateContent xmlns:mc="http://schemas.openxmlformats.org/markup-compatibility/2006">
               <mc:Choice xmlns:v="urn:schemas-microsoft-com:vml" Requires="v">
-                <p:oleObj spid="_x0000_s137250" name="Bitmap Image" r:id="rId4" imgW="9888330" imgH="6838095" progId="PBrush">
+                <p:oleObj spid="_x0000_s137251" name="Bitmap Image" r:id="rId4" imgW="9888330" imgH="6838095" progId="PBrush">
                   <p:embed/>
                 </p:oleObj>
               </mc:Choice>
@@ -18309,7 +18309,7 @@
           <a:graphicData uri="http://schemas.openxmlformats.org/presentationml/2006/ole">
             <mc:AlternateContent xmlns:mc="http://schemas.openxmlformats.org/markup-compatibility/2006">
               <mc:Choice xmlns:v="urn:schemas-microsoft-com:vml" Requires="v">
-                <p:oleObj spid="_x0000_s138274" name="Bitmap Image" r:id="rId4" imgW="5877745" imgH="2123810" progId="PBrush">
+                <p:oleObj spid="_x0000_s138275" name="Bitmap Image" r:id="rId4" imgW="5877745" imgH="2123810" progId="PBrush">
                   <p:embed/>
                 </p:oleObj>
               </mc:Choice>
@@ -18809,7 +18809,7 @@
           <a:graphicData uri="http://schemas.openxmlformats.org/presentationml/2006/ole">
             <mc:AlternateContent xmlns:mc="http://schemas.openxmlformats.org/markup-compatibility/2006">
               <mc:Choice xmlns:v="urn:schemas-microsoft-com:vml" Requires="v">
-                <p:oleObj spid="_x0000_s139298" name="Bitmap Image" r:id="rId4" imgW="7923810" imgH="5304762" progId="PBrush">
+                <p:oleObj spid="_x0000_s139299" name="Bitmap Image" r:id="rId4" imgW="7923810" imgH="5304762" progId="PBrush">
                   <p:embed/>
                 </p:oleObj>
               </mc:Choice>
@@ -19329,7 +19329,7 @@
           <a:graphicData uri="http://schemas.openxmlformats.org/presentationml/2006/ole">
             <mc:AlternateContent xmlns:mc="http://schemas.openxmlformats.org/markup-compatibility/2006">
               <mc:Choice xmlns:v="urn:schemas-microsoft-com:vml" Requires="v">
-                <p:oleObj spid="_x0000_s140354" name="Bitmap Image" r:id="rId4" imgW="5742857" imgH="1914286" progId="PBrush">
+                <p:oleObj spid="_x0000_s140356" name="Bitmap Image" r:id="rId4" imgW="5742857" imgH="1914286" progId="PBrush">
                   <p:embed/>
                 </p:oleObj>
               </mc:Choice>
@@ -19422,7 +19422,7 @@
           <a:graphicData uri="http://schemas.openxmlformats.org/presentationml/2006/ole">
             <mc:AlternateContent xmlns:mc="http://schemas.openxmlformats.org/markup-compatibility/2006">
               <mc:Choice xmlns:v="urn:schemas-microsoft-com:vml" Requires="v">
-                <p:oleObj spid="_x0000_s140355" name="Bitmap Image" r:id="rId6" imgW="5904762" imgH="1914286" progId="PBrush">
+                <p:oleObj spid="_x0000_s140357" name="Bitmap Image" r:id="rId6" imgW="5904762" imgH="1914286" progId="PBrush">
                   <p:embed/>
                 </p:oleObj>
               </mc:Choice>
@@ -19929,8 +19929,12 @@
           </a:p>
           <a:p>
             <a:r>
+              <a:rPr lang="en-US"/>
+              <a:t>P &gt;= </a:t>
+            </a:r>
+            <a:r>
               <a:rPr lang="en-US" dirty="0"/>
-              <a:t>P &lt;= 0.75</a:t>
+              <a:t>0.75</a:t>
             </a:r>
           </a:p>
           <a:p>

</xml_diff>